<commit_message>
Reviewed @economidis-nick's latest contribution. Grouped related PPT elements.
</commit_message>
<xml_diff>
--- a/V3.1.1/resources/welding_position.pptx
+++ b/V3.1.1/resources/welding_position.pptx
@@ -260,7 +260,7 @@
           <a:p>
             <a:fld id="{98F5D89C-2B0F-4646-846B-127482DFFE40}" type="datetimeFigureOut">
               <a:rPr lang="en-US" smtClean="0"/>
-              <a:t>1/21/2023</a:t>
+              <a:t>1/23/2023</a:t>
             </a:fld>
             <a:endParaRPr lang="en-US"/>
           </a:p>
@@ -314,7 +314,7 @@
           <a:p>
             <a:fld id="{9C325B0B-39A0-4A66-933C-CE99E557D7A8}" type="slidenum">
               <a:rPr lang="en-US" smtClean="0"/>
-              <a:t>‹#›</a:t>
+              <a:t>‹Nr.›</a:t>
             </a:fld>
             <a:endParaRPr lang="en-US"/>
           </a:p>
@@ -458,7 +458,7 @@
           <a:p>
             <a:fld id="{98F5D89C-2B0F-4646-846B-127482DFFE40}" type="datetimeFigureOut">
               <a:rPr lang="en-US" smtClean="0"/>
-              <a:t>1/21/2023</a:t>
+              <a:t>1/23/2023</a:t>
             </a:fld>
             <a:endParaRPr lang="en-US"/>
           </a:p>
@@ -512,7 +512,7 @@
           <a:p>
             <a:fld id="{9C325B0B-39A0-4A66-933C-CE99E557D7A8}" type="slidenum">
               <a:rPr lang="en-US" smtClean="0"/>
-              <a:t>‹#›</a:t>
+              <a:t>‹Nr.›</a:t>
             </a:fld>
             <a:endParaRPr lang="en-US"/>
           </a:p>
@@ -666,7 +666,7 @@
           <a:p>
             <a:fld id="{98F5D89C-2B0F-4646-846B-127482DFFE40}" type="datetimeFigureOut">
               <a:rPr lang="en-US" smtClean="0"/>
-              <a:t>1/21/2023</a:t>
+              <a:t>1/23/2023</a:t>
             </a:fld>
             <a:endParaRPr lang="en-US"/>
           </a:p>
@@ -720,7 +720,7 @@
           <a:p>
             <a:fld id="{9C325B0B-39A0-4A66-933C-CE99E557D7A8}" type="slidenum">
               <a:rPr lang="en-US" smtClean="0"/>
-              <a:t>‹#›</a:t>
+              <a:t>‹Nr.›</a:t>
             </a:fld>
             <a:endParaRPr lang="en-US"/>
           </a:p>
@@ -864,7 +864,7 @@
           <a:p>
             <a:fld id="{98F5D89C-2B0F-4646-846B-127482DFFE40}" type="datetimeFigureOut">
               <a:rPr lang="en-US" smtClean="0"/>
-              <a:t>1/21/2023</a:t>
+              <a:t>1/23/2023</a:t>
             </a:fld>
             <a:endParaRPr lang="en-US"/>
           </a:p>
@@ -918,7 +918,7 @@
           <a:p>
             <a:fld id="{9C325B0B-39A0-4A66-933C-CE99E557D7A8}" type="slidenum">
               <a:rPr lang="en-US" smtClean="0"/>
-              <a:t>‹#›</a:t>
+              <a:t>‹Nr.›</a:t>
             </a:fld>
             <a:endParaRPr lang="en-US"/>
           </a:p>
@@ -1139,7 +1139,7 @@
           <a:p>
             <a:fld id="{98F5D89C-2B0F-4646-846B-127482DFFE40}" type="datetimeFigureOut">
               <a:rPr lang="en-US" smtClean="0"/>
-              <a:t>1/21/2023</a:t>
+              <a:t>1/23/2023</a:t>
             </a:fld>
             <a:endParaRPr lang="en-US"/>
           </a:p>
@@ -1193,7 +1193,7 @@
           <a:p>
             <a:fld id="{9C325B0B-39A0-4A66-933C-CE99E557D7A8}" type="slidenum">
               <a:rPr lang="en-US" smtClean="0"/>
-              <a:t>‹#›</a:t>
+              <a:t>‹Nr.›</a:t>
             </a:fld>
             <a:endParaRPr lang="en-US"/>
           </a:p>
@@ -1404,7 +1404,7 @@
           <a:p>
             <a:fld id="{98F5D89C-2B0F-4646-846B-127482DFFE40}" type="datetimeFigureOut">
               <a:rPr lang="en-US" smtClean="0"/>
-              <a:t>1/21/2023</a:t>
+              <a:t>1/23/2023</a:t>
             </a:fld>
             <a:endParaRPr lang="en-US"/>
           </a:p>
@@ -1458,7 +1458,7 @@
           <a:p>
             <a:fld id="{9C325B0B-39A0-4A66-933C-CE99E557D7A8}" type="slidenum">
               <a:rPr lang="en-US" smtClean="0"/>
-              <a:t>‹#›</a:t>
+              <a:t>‹Nr.›</a:t>
             </a:fld>
             <a:endParaRPr lang="en-US"/>
           </a:p>
@@ -1816,7 +1816,7 @@
           <a:p>
             <a:fld id="{98F5D89C-2B0F-4646-846B-127482DFFE40}" type="datetimeFigureOut">
               <a:rPr lang="en-US" smtClean="0"/>
-              <a:t>1/21/2023</a:t>
+              <a:t>1/23/2023</a:t>
             </a:fld>
             <a:endParaRPr lang="en-US"/>
           </a:p>
@@ -1870,7 +1870,7 @@
           <a:p>
             <a:fld id="{9C325B0B-39A0-4A66-933C-CE99E557D7A8}" type="slidenum">
               <a:rPr lang="en-US" smtClean="0"/>
-              <a:t>‹#›</a:t>
+              <a:t>‹Nr.›</a:t>
             </a:fld>
             <a:endParaRPr lang="en-US"/>
           </a:p>
@@ -1957,7 +1957,7 @@
           <a:p>
             <a:fld id="{98F5D89C-2B0F-4646-846B-127482DFFE40}" type="datetimeFigureOut">
               <a:rPr lang="en-US" smtClean="0"/>
-              <a:t>1/21/2023</a:t>
+              <a:t>1/23/2023</a:t>
             </a:fld>
             <a:endParaRPr lang="en-US"/>
           </a:p>
@@ -2011,7 +2011,7 @@
           <a:p>
             <a:fld id="{9C325B0B-39A0-4A66-933C-CE99E557D7A8}" type="slidenum">
               <a:rPr lang="en-US" smtClean="0"/>
-              <a:t>‹#›</a:t>
+              <a:t>‹Nr.›</a:t>
             </a:fld>
             <a:endParaRPr lang="en-US"/>
           </a:p>
@@ -2070,7 +2070,7 @@
           <a:p>
             <a:fld id="{98F5D89C-2B0F-4646-846B-127482DFFE40}" type="datetimeFigureOut">
               <a:rPr lang="en-US" smtClean="0"/>
-              <a:t>1/21/2023</a:t>
+              <a:t>1/23/2023</a:t>
             </a:fld>
             <a:endParaRPr lang="en-US"/>
           </a:p>
@@ -2124,7 +2124,7 @@
           <a:p>
             <a:fld id="{9C325B0B-39A0-4A66-933C-CE99E557D7A8}" type="slidenum">
               <a:rPr lang="en-US" smtClean="0"/>
-              <a:t>‹#›</a:t>
+              <a:t>‹Nr.›</a:t>
             </a:fld>
             <a:endParaRPr lang="en-US"/>
           </a:p>
@@ -2381,7 +2381,7 @@
           <a:p>
             <a:fld id="{98F5D89C-2B0F-4646-846B-127482DFFE40}" type="datetimeFigureOut">
               <a:rPr lang="en-US" smtClean="0"/>
-              <a:t>1/21/2023</a:t>
+              <a:t>1/23/2023</a:t>
             </a:fld>
             <a:endParaRPr lang="en-US"/>
           </a:p>
@@ -2435,7 +2435,7 @@
           <a:p>
             <a:fld id="{9C325B0B-39A0-4A66-933C-CE99E557D7A8}" type="slidenum">
               <a:rPr lang="en-US" smtClean="0"/>
-              <a:t>‹#›</a:t>
+              <a:t>‹Nr.›</a:t>
             </a:fld>
             <a:endParaRPr lang="en-US"/>
           </a:p>
@@ -2669,7 +2669,7 @@
           <a:p>
             <a:fld id="{98F5D89C-2B0F-4646-846B-127482DFFE40}" type="datetimeFigureOut">
               <a:rPr lang="en-US" smtClean="0"/>
-              <a:t>1/21/2023</a:t>
+              <a:t>1/23/2023</a:t>
             </a:fld>
             <a:endParaRPr lang="en-US"/>
           </a:p>
@@ -2723,7 +2723,7 @@
           <a:p>
             <a:fld id="{9C325B0B-39A0-4A66-933C-CE99E557D7A8}" type="slidenum">
               <a:rPr lang="en-US" smtClean="0"/>
-              <a:t>‹#›</a:t>
+              <a:t>‹Nr.›</a:t>
             </a:fld>
             <a:endParaRPr lang="en-US"/>
           </a:p>
@@ -2910,7 +2910,7 @@
           <a:p>
             <a:fld id="{98F5D89C-2B0F-4646-846B-127482DFFE40}" type="datetimeFigureOut">
               <a:rPr lang="en-US" smtClean="0"/>
-              <a:t>1/21/2023</a:t>
+              <a:t>1/23/2023</a:t>
             </a:fld>
             <a:endParaRPr lang="en-US"/>
           </a:p>
@@ -3000,7 +3000,7 @@
           <a:p>
             <a:fld id="{9C325B0B-39A0-4A66-933C-CE99E557D7A8}" type="slidenum">
               <a:rPr lang="en-US" smtClean="0"/>
-              <a:t>‹#›</a:t>
+              <a:t>‹Nr.›</a:t>
             </a:fld>
             <a:endParaRPr lang="en-US"/>
           </a:p>
@@ -3327,761 +3327,807 @@
           <a:chExt cx="0" cy="0"/>
         </a:xfrm>
       </p:grpSpPr>
-      <p:sp>
-        <p:nvSpPr>
-          <p:cNvPr id="9" name="Parallelogram 8">
-            <a:extLst>
-              <a:ext uri="{FF2B5EF4-FFF2-40B4-BE49-F238E27FC236}">
-                <a16:creationId xmlns:a16="http://schemas.microsoft.com/office/drawing/2014/main" id="{A5BA82E9-035E-08E7-B399-87E23E10FD7E}"/>
-              </a:ext>
-            </a:extLst>
-          </p:cNvPr>
-          <p:cNvSpPr/>
+      <p:grpSp>
+        <p:nvGrpSpPr>
+          <p:cNvPr id="2" name="Gruppieren 1">
+            <a:extLst>
+              <a:ext uri="{FF2B5EF4-FFF2-40B4-BE49-F238E27FC236}">
+                <a16:creationId xmlns:a16="http://schemas.microsoft.com/office/drawing/2014/main" id="{F8F11A33-FDE5-CEE0-F544-F2E79F9303B1}"/>
+              </a:ext>
+            </a:extLst>
+          </p:cNvPr>
+          <p:cNvGrpSpPr>
+            <a:grpSpLocks noChangeAspect="1"/>
+          </p:cNvGrpSpPr>
           <p:nvPr/>
-        </p:nvSpPr>
-        <p:spPr>
+        </p:nvGrpSpPr>
+        <p:grpSpPr>
           <a:xfrm>
-            <a:off x="539553" y="2209327"/>
-            <a:ext cx="4407294" cy="1982146"/>
+            <a:off x="539553" y="1093536"/>
+            <a:ext cx="4407294" cy="3575297"/>
+            <a:chOff x="539553" y="1093536"/>
+            <a:chExt cx="4407294" cy="3575297"/>
           </a:xfrm>
-          <a:prstGeom prst="parallelogram">
-            <a:avLst>
-              <a:gd name="adj" fmla="val 37640"/>
-            </a:avLst>
-          </a:prstGeom>
-          <a:solidFill>
-            <a:srgbClr val="C5C8CA"/>
-          </a:solidFill>
-          <a:ln/>
-        </p:spPr>
-        <p:style>
-          <a:lnRef idx="2">
-            <a:schemeClr val="accent1">
-              <a:shade val="50000"/>
-            </a:schemeClr>
-          </a:lnRef>
-          <a:fillRef idx="1">
-            <a:schemeClr val="accent1"/>
-          </a:fillRef>
-          <a:effectRef idx="0">
-            <a:schemeClr val="accent1"/>
-          </a:effectRef>
-          <a:fontRef idx="minor">
-            <a:schemeClr val="lt1"/>
-          </a:fontRef>
-        </p:style>
-        <p:txBody>
-          <a:bodyPr rtlCol="0" anchor="ctr"/>
-          <a:lstStyle/>
-          <a:p>
-            <a:pPr algn="ctr"/>
-            <a:endParaRPr lang="en-US" b="1"/>
-          </a:p>
-        </p:txBody>
-      </p:sp>
-      <p:sp>
-        <p:nvSpPr>
-          <p:cNvPr id="8" name="Parallelogram 7">
-            <a:extLst>
-              <a:ext uri="{FF2B5EF4-FFF2-40B4-BE49-F238E27FC236}">
-                <a16:creationId xmlns:a16="http://schemas.microsoft.com/office/drawing/2014/main" id="{29BDC898-F52C-467B-67CB-5DE87D69C70C}"/>
-              </a:ext>
-            </a:extLst>
-          </p:cNvPr>
-          <p:cNvSpPr/>
+        </p:grpSpPr>
+        <p:sp>
+          <p:nvSpPr>
+            <p:cNvPr id="9" name="Parallelogram 8">
+              <a:extLst>
+                <a:ext uri="{FF2B5EF4-FFF2-40B4-BE49-F238E27FC236}">
+                  <a16:creationId xmlns:a16="http://schemas.microsoft.com/office/drawing/2014/main" id="{A5BA82E9-035E-08E7-B399-87E23E10FD7E}"/>
+                </a:ext>
+              </a:extLst>
+            </p:cNvPr>
+            <p:cNvSpPr/>
+            <p:nvPr/>
+          </p:nvSpPr>
+          <p:spPr>
+            <a:xfrm>
+              <a:off x="539553" y="2209327"/>
+              <a:ext cx="4407294" cy="1982146"/>
+            </a:xfrm>
+            <a:prstGeom prst="parallelogram">
+              <a:avLst>
+                <a:gd name="adj" fmla="val 37640"/>
+              </a:avLst>
+            </a:prstGeom>
+            <a:solidFill>
+              <a:srgbClr val="C5C8CA"/>
+            </a:solidFill>
+            <a:ln/>
+          </p:spPr>
+          <p:style>
+            <a:lnRef idx="2">
+              <a:schemeClr val="accent1">
+                <a:shade val="50000"/>
+              </a:schemeClr>
+            </a:lnRef>
+            <a:fillRef idx="1">
+              <a:schemeClr val="accent1"/>
+            </a:fillRef>
+            <a:effectRef idx="0">
+              <a:schemeClr val="accent1"/>
+            </a:effectRef>
+            <a:fontRef idx="minor">
+              <a:schemeClr val="lt1"/>
+            </a:fontRef>
+          </p:style>
+          <p:txBody>
+            <a:bodyPr rtlCol="0" anchor="ctr"/>
+            <a:lstStyle/>
+            <a:p>
+              <a:pPr algn="ctr"/>
+              <a:endParaRPr lang="en-US" b="1"/>
+            </a:p>
+          </p:txBody>
+        </p:sp>
+        <p:sp>
+          <p:nvSpPr>
+            <p:cNvPr id="8" name="Parallelogram 7">
+              <a:extLst>
+                <a:ext uri="{FF2B5EF4-FFF2-40B4-BE49-F238E27FC236}">
+                  <a16:creationId xmlns:a16="http://schemas.microsoft.com/office/drawing/2014/main" id="{29BDC898-F52C-467B-67CB-5DE87D69C70C}"/>
+                </a:ext>
+              </a:extLst>
+            </p:cNvPr>
+            <p:cNvSpPr/>
+            <p:nvPr/>
+          </p:nvSpPr>
+          <p:spPr>
+            <a:xfrm rot="17371111">
+              <a:off x="657273" y="2200174"/>
+              <a:ext cx="2692876" cy="1076485"/>
+            </a:xfrm>
+            <a:prstGeom prst="parallelogram">
+              <a:avLst>
+                <a:gd name="adj" fmla="val 57711"/>
+              </a:avLst>
+            </a:prstGeom>
+            <a:solidFill>
+              <a:srgbClr val="A6A6A6"/>
+            </a:solidFill>
+            <a:ln/>
+          </p:spPr>
+          <p:style>
+            <a:lnRef idx="2">
+              <a:schemeClr val="accent1">
+                <a:shade val="50000"/>
+              </a:schemeClr>
+            </a:lnRef>
+            <a:fillRef idx="1">
+              <a:schemeClr val="accent1"/>
+            </a:fillRef>
+            <a:effectRef idx="0">
+              <a:schemeClr val="accent1"/>
+            </a:effectRef>
+            <a:fontRef idx="minor">
+              <a:schemeClr val="lt1"/>
+            </a:fontRef>
+          </p:style>
+          <p:txBody>
+            <a:bodyPr rtlCol="0" anchor="ctr"/>
+            <a:lstStyle/>
+            <a:p>
+              <a:pPr algn="ctr"/>
+              <a:endParaRPr lang="en-US" b="1"/>
+            </a:p>
+          </p:txBody>
+        </p:sp>
+        <p:cxnSp>
+          <p:nvCxnSpPr>
+            <p:cNvPr id="11" name="Straight Connector 10">
+              <a:extLst>
+                <a:ext uri="{FF2B5EF4-FFF2-40B4-BE49-F238E27FC236}">
+                  <a16:creationId xmlns:a16="http://schemas.microsoft.com/office/drawing/2014/main" id="{FDBC4807-EA2F-1D54-1C08-6529AE959957}"/>
+                </a:ext>
+              </a:extLst>
+            </p:cNvPr>
+            <p:cNvCxnSpPr/>
+            <p:nvPr/>
+          </p:nvCxnSpPr>
+          <p:spPr>
+            <a:xfrm flipV="1">
+              <a:off x="2073019" y="2195252"/>
+              <a:ext cx="687220" cy="1976151"/>
+            </a:xfrm>
+            <a:prstGeom prst="line">
+              <a:avLst/>
+            </a:prstGeom>
+            <a:ln w="28575">
+              <a:solidFill>
+                <a:srgbClr val="FF0000"/>
+              </a:solidFill>
+              <a:headEnd type="oval" w="lg" len="lg"/>
+              <a:tailEnd type="oval" w="lg" len="lg"/>
+            </a:ln>
+          </p:spPr>
+          <p:style>
+            <a:lnRef idx="1">
+              <a:schemeClr val="accent2"/>
+            </a:lnRef>
+            <a:fillRef idx="0">
+              <a:schemeClr val="accent2"/>
+            </a:fillRef>
+            <a:effectRef idx="0">
+              <a:schemeClr val="accent2"/>
+            </a:effectRef>
+            <a:fontRef idx="minor">
+              <a:schemeClr val="tx1"/>
+            </a:fontRef>
+          </p:style>
+        </p:cxnSp>
+        <p:cxnSp>
+          <p:nvCxnSpPr>
+            <p:cNvPr id="13" name="Straight Connector 12">
+              <a:extLst>
+                <a:ext uri="{FF2B5EF4-FFF2-40B4-BE49-F238E27FC236}">
+                  <a16:creationId xmlns:a16="http://schemas.microsoft.com/office/drawing/2014/main" id="{1484DE0D-C3CC-BC4A-1342-3FC39AEB4681}"/>
+                </a:ext>
+              </a:extLst>
+            </p:cNvPr>
+            <p:cNvCxnSpPr>
+              <a:cxnSpLocks/>
+            </p:cNvCxnSpPr>
+            <p:nvPr/>
+          </p:nvCxnSpPr>
+          <p:spPr>
+            <a:xfrm flipV="1">
+              <a:off x="2416629" y="1539145"/>
+              <a:ext cx="1399998" cy="1667250"/>
+            </a:xfrm>
+            <a:prstGeom prst="line">
+              <a:avLst/>
+            </a:prstGeom>
+            <a:ln w="28575">
+              <a:solidFill>
+                <a:schemeClr val="accent1">
+                  <a:lumMod val="50000"/>
+                </a:schemeClr>
+              </a:solidFill>
+              <a:headEnd type="oval" w="lg" len="lg"/>
+              <a:tailEnd type="triangle" w="lg" len="lg"/>
+            </a:ln>
+          </p:spPr>
+          <p:style>
+            <a:lnRef idx="1">
+              <a:schemeClr val="accent2"/>
+            </a:lnRef>
+            <a:fillRef idx="0">
+              <a:schemeClr val="accent2"/>
+            </a:fillRef>
+            <a:effectRef idx="0">
+              <a:schemeClr val="accent2"/>
+            </a:effectRef>
+            <a:fontRef idx="minor">
+              <a:schemeClr val="tx1"/>
+            </a:fontRef>
+          </p:style>
+        </p:cxnSp>
+        <p:sp>
+          <p:nvSpPr>
+            <p:cNvPr id="16" name="TextBox 15">
+              <a:extLst>
+                <a:ext uri="{FF2B5EF4-FFF2-40B4-BE49-F238E27FC236}">
+                  <a16:creationId xmlns:a16="http://schemas.microsoft.com/office/drawing/2014/main" id="{29AF9A7E-98F0-6A5E-BFF3-2DEDD82940A6}"/>
+                </a:ext>
+              </a:extLst>
+            </p:cNvPr>
+            <p:cNvSpPr txBox="1"/>
+            <p:nvPr/>
+          </p:nvSpPr>
+          <p:spPr>
+            <a:xfrm>
+              <a:off x="1986671" y="4299501"/>
+              <a:ext cx="301686" cy="369332"/>
+            </a:xfrm>
+            <a:prstGeom prst="rect">
+              <a:avLst/>
+            </a:prstGeom>
+            <a:noFill/>
+          </p:spPr>
+          <p:txBody>
+            <a:bodyPr wrap="none" rtlCol="0">
+              <a:spAutoFit/>
+            </a:bodyPr>
+            <a:lstStyle/>
+            <a:p>
+              <a:r>
+                <a:rPr lang="en-US" b="1" dirty="0">
+                  <a:solidFill>
+                    <a:srgbClr val="FF0000"/>
+                  </a:solidFill>
+                </a:rPr>
+                <a:t>1</a:t>
+              </a:r>
+            </a:p>
+          </p:txBody>
+        </p:sp>
+        <p:sp>
+          <p:nvSpPr>
+            <p:cNvPr id="17" name="TextBox 16">
+              <a:extLst>
+                <a:ext uri="{FF2B5EF4-FFF2-40B4-BE49-F238E27FC236}">
+                  <a16:creationId xmlns:a16="http://schemas.microsoft.com/office/drawing/2014/main" id="{332C18DA-9106-000E-66C0-039168B74F3F}"/>
+                </a:ext>
+              </a:extLst>
+            </p:cNvPr>
+            <p:cNvSpPr txBox="1"/>
+            <p:nvPr/>
+          </p:nvSpPr>
+          <p:spPr>
+            <a:xfrm>
+              <a:off x="2655906" y="1703817"/>
+              <a:ext cx="301686" cy="369332"/>
+            </a:xfrm>
+            <a:prstGeom prst="rect">
+              <a:avLst/>
+            </a:prstGeom>
+            <a:noFill/>
+          </p:spPr>
+          <p:txBody>
+            <a:bodyPr wrap="none" rtlCol="0">
+              <a:spAutoFit/>
+            </a:bodyPr>
+            <a:lstStyle>
+              <a:defPPr>
+                <a:defRPr lang="en-US"/>
+              </a:defPPr>
+              <a:lvl1pPr>
+                <a:defRPr b="1">
+                  <a:solidFill>
+                    <a:srgbClr val="FF3272"/>
+                  </a:solidFill>
+                </a:defRPr>
+              </a:lvl1pPr>
+            </a:lstStyle>
+            <a:p>
+              <a:r>
+                <a:rPr lang="en-US" dirty="0">
+                  <a:solidFill>
+                    <a:srgbClr val="FF0000"/>
+                  </a:solidFill>
+                </a:rPr>
+                <a:t>0</a:t>
+              </a:r>
+            </a:p>
+          </p:txBody>
+        </p:sp>
+        <p:sp>
+          <p:nvSpPr>
+            <p:cNvPr id="20" name="TextBox 19">
+              <a:extLst>
+                <a:ext uri="{FF2B5EF4-FFF2-40B4-BE49-F238E27FC236}">
+                  <a16:creationId xmlns:a16="http://schemas.microsoft.com/office/drawing/2014/main" id="{B62EA235-AF99-D67A-4B6E-482C0B264CFA}"/>
+                </a:ext>
+              </a:extLst>
+            </p:cNvPr>
+            <p:cNvSpPr txBox="1"/>
+            <p:nvPr/>
+          </p:nvSpPr>
+          <p:spPr>
+            <a:xfrm>
+              <a:off x="3695250" y="1093536"/>
+              <a:ext cx="739754" cy="369332"/>
+            </a:xfrm>
+            <a:prstGeom prst="rect">
+              <a:avLst/>
+            </a:prstGeom>
+            <a:noFill/>
+          </p:spPr>
+          <p:txBody>
+            <a:bodyPr wrap="none" rtlCol="0">
+              <a:spAutoFit/>
+            </a:bodyPr>
+            <a:lstStyle/>
+            <a:p>
+              <a:r>
+                <a:rPr lang="en-US" b="1" dirty="0">
+                  <a:solidFill>
+                    <a:srgbClr val="FF3272"/>
+                  </a:solidFill>
+                </a:rPr>
+                <a:t>(</a:t>
+              </a:r>
+              <a:r>
+                <a:rPr lang="en-US" b="1" dirty="0" err="1">
+                  <a:solidFill>
+                    <a:srgbClr val="FF0000"/>
+                  </a:solidFill>
+                </a:rPr>
+                <a:t>x,y,z</a:t>
+              </a:r>
+              <a:r>
+                <a:rPr lang="en-US" b="1" dirty="0">
+                  <a:solidFill>
+                    <a:srgbClr val="FF0000"/>
+                  </a:solidFill>
+                </a:rPr>
+                <a:t>)</a:t>
+              </a:r>
+            </a:p>
+          </p:txBody>
+        </p:sp>
+        <p:sp>
+          <p:nvSpPr>
+            <p:cNvPr id="21" name="TextBox 20">
+              <a:extLst>
+                <a:ext uri="{FF2B5EF4-FFF2-40B4-BE49-F238E27FC236}">
+                  <a16:creationId xmlns:a16="http://schemas.microsoft.com/office/drawing/2014/main" id="{FB822551-2C57-BC72-1484-3009A7AB261F}"/>
+                </a:ext>
+              </a:extLst>
+            </p:cNvPr>
+            <p:cNvSpPr txBox="1"/>
+            <p:nvPr/>
+          </p:nvSpPr>
+          <p:spPr>
+            <a:xfrm>
+              <a:off x="2606992" y="2991121"/>
+              <a:ext cx="306494" cy="369332"/>
+            </a:xfrm>
+            <a:prstGeom prst="rect">
+              <a:avLst/>
+            </a:prstGeom>
+            <a:noFill/>
+          </p:spPr>
+          <p:txBody>
+            <a:bodyPr wrap="none" rtlCol="0">
+              <a:spAutoFit/>
+            </a:bodyPr>
+            <a:lstStyle/>
+            <a:p>
+              <a:r>
+                <a:rPr lang="en-US" b="1" dirty="0">
+                  <a:solidFill>
+                    <a:srgbClr val="FF0000"/>
+                  </a:solidFill>
+                </a:rPr>
+                <a:t>u</a:t>
+              </a:r>
+            </a:p>
+          </p:txBody>
+        </p:sp>
+      </p:grpSp>
+      <p:grpSp>
+        <p:nvGrpSpPr>
+          <p:cNvPr id="3" name="Gruppieren 2">
+            <a:extLst>
+              <a:ext uri="{FF2B5EF4-FFF2-40B4-BE49-F238E27FC236}">
+                <a16:creationId xmlns:a16="http://schemas.microsoft.com/office/drawing/2014/main" id="{4B09ED0D-0D34-C8C4-3AFD-2711E37670D0}"/>
+              </a:ext>
+            </a:extLst>
+          </p:cNvPr>
+          <p:cNvGrpSpPr>
+            <a:grpSpLocks noChangeAspect="1"/>
+          </p:cNvGrpSpPr>
           <p:nvPr/>
-        </p:nvSpPr>
-        <p:spPr>
-          <a:xfrm rot="17371111">
-            <a:off x="657273" y="2200174"/>
-            <a:ext cx="2692876" cy="1076485"/>
+        </p:nvGrpSpPr>
+        <p:grpSpPr>
+          <a:xfrm>
+            <a:off x="5957799" y="1828800"/>
+            <a:ext cx="5276258" cy="2840033"/>
+            <a:chOff x="5957799" y="1828800"/>
+            <a:chExt cx="5276258" cy="2840033"/>
           </a:xfrm>
-          <a:prstGeom prst="parallelogram">
-            <a:avLst>
-              <a:gd name="adj" fmla="val 57711"/>
-            </a:avLst>
-          </a:prstGeom>
-          <a:solidFill>
-            <a:srgbClr val="A6A6A6"/>
-          </a:solidFill>
-          <a:ln/>
-        </p:spPr>
-        <p:style>
-          <a:lnRef idx="2">
-            <a:schemeClr val="accent1">
-              <a:shade val="50000"/>
-            </a:schemeClr>
-          </a:lnRef>
-          <a:fillRef idx="1">
-            <a:schemeClr val="accent1"/>
-          </a:fillRef>
-          <a:effectRef idx="0">
-            <a:schemeClr val="accent1"/>
-          </a:effectRef>
-          <a:fontRef idx="minor">
-            <a:schemeClr val="lt1"/>
-          </a:fontRef>
-        </p:style>
-        <p:txBody>
-          <a:bodyPr rtlCol="0" anchor="ctr"/>
-          <a:lstStyle/>
-          <a:p>
-            <a:pPr algn="ctr"/>
-            <a:endParaRPr lang="en-US" b="1"/>
-          </a:p>
-        </p:txBody>
-      </p:sp>
-      <p:cxnSp>
-        <p:nvCxnSpPr>
-          <p:cNvPr id="11" name="Straight Connector 10">
-            <a:extLst>
-              <a:ext uri="{FF2B5EF4-FFF2-40B4-BE49-F238E27FC236}">
-                <a16:creationId xmlns:a16="http://schemas.microsoft.com/office/drawing/2014/main" id="{FDBC4807-EA2F-1D54-1C08-6529AE959957}"/>
-              </a:ext>
-            </a:extLst>
-          </p:cNvPr>
-          <p:cNvCxnSpPr/>
-          <p:nvPr/>
-        </p:nvCxnSpPr>
-        <p:spPr>
-          <a:xfrm flipV="1">
-            <a:off x="2073019" y="2195252"/>
-            <a:ext cx="687220" cy="1976151"/>
-          </a:xfrm>
-          <a:prstGeom prst="line">
-            <a:avLst/>
-          </a:prstGeom>
-          <a:ln w="28575">
-            <a:solidFill>
-              <a:srgbClr val="FF0000"/>
-            </a:solidFill>
-            <a:headEnd type="oval" w="lg" len="lg"/>
-            <a:tailEnd type="oval" w="lg" len="lg"/>
-          </a:ln>
-        </p:spPr>
-        <p:style>
-          <a:lnRef idx="1">
-            <a:schemeClr val="accent2"/>
-          </a:lnRef>
-          <a:fillRef idx="0">
-            <a:schemeClr val="accent2"/>
-          </a:fillRef>
-          <a:effectRef idx="0">
-            <a:schemeClr val="accent2"/>
-          </a:effectRef>
-          <a:fontRef idx="minor">
-            <a:schemeClr val="tx1"/>
-          </a:fontRef>
-        </p:style>
-      </p:cxnSp>
-      <p:cxnSp>
-        <p:nvCxnSpPr>
-          <p:cNvPr id="13" name="Straight Connector 12">
-            <a:extLst>
-              <a:ext uri="{FF2B5EF4-FFF2-40B4-BE49-F238E27FC236}">
-                <a16:creationId xmlns:a16="http://schemas.microsoft.com/office/drawing/2014/main" id="{1484DE0D-C3CC-BC4A-1342-3FC39AEB4681}"/>
-              </a:ext>
-            </a:extLst>
-          </p:cNvPr>
-          <p:cNvCxnSpPr>
-            <a:cxnSpLocks/>
-          </p:cNvCxnSpPr>
-          <p:nvPr/>
-        </p:nvCxnSpPr>
-        <p:spPr>
-          <a:xfrm flipV="1">
-            <a:off x="2416629" y="1539145"/>
-            <a:ext cx="1399998" cy="1667250"/>
-          </a:xfrm>
-          <a:prstGeom prst="line">
-            <a:avLst/>
-          </a:prstGeom>
-          <a:ln w="28575">
-            <a:solidFill>
-              <a:schemeClr val="accent1">
-                <a:lumMod val="50000"/>
-              </a:schemeClr>
-            </a:solidFill>
-            <a:headEnd type="oval" w="lg" len="lg"/>
-            <a:tailEnd type="triangle" w="lg" len="lg"/>
-          </a:ln>
-        </p:spPr>
-        <p:style>
-          <a:lnRef idx="1">
-            <a:schemeClr val="accent2"/>
-          </a:lnRef>
-          <a:fillRef idx="0">
-            <a:schemeClr val="accent2"/>
-          </a:fillRef>
-          <a:effectRef idx="0">
-            <a:schemeClr val="accent2"/>
-          </a:effectRef>
-          <a:fontRef idx="minor">
-            <a:schemeClr val="tx1"/>
-          </a:fontRef>
-        </p:style>
-      </p:cxnSp>
-      <p:sp>
-        <p:nvSpPr>
-          <p:cNvPr id="16" name="TextBox 15">
-            <a:extLst>
-              <a:ext uri="{FF2B5EF4-FFF2-40B4-BE49-F238E27FC236}">
-                <a16:creationId xmlns:a16="http://schemas.microsoft.com/office/drawing/2014/main" id="{29AF9A7E-98F0-6A5E-BFF3-2DEDD82940A6}"/>
-              </a:ext>
-            </a:extLst>
-          </p:cNvPr>
-          <p:cNvSpPr txBox="1"/>
-          <p:nvPr/>
-        </p:nvSpPr>
-        <p:spPr>
-          <a:xfrm>
-            <a:off x="1986671" y="4299501"/>
-            <a:ext cx="301686" cy="369332"/>
-          </a:xfrm>
-          <a:prstGeom prst="rect">
-            <a:avLst/>
-          </a:prstGeom>
-          <a:noFill/>
-        </p:spPr>
-        <p:txBody>
-          <a:bodyPr wrap="none" rtlCol="0">
-            <a:spAutoFit/>
-          </a:bodyPr>
-          <a:lstStyle/>
-          <a:p>
-            <a:r>
-              <a:rPr lang="en-US" b="1" dirty="0">
-                <a:solidFill>
-                  <a:srgbClr val="FF0000"/>
-                </a:solidFill>
-              </a:rPr>
-              <a:t>1</a:t>
-            </a:r>
-          </a:p>
-        </p:txBody>
-      </p:sp>
-      <p:sp>
-        <p:nvSpPr>
-          <p:cNvPr id="17" name="TextBox 16">
-            <a:extLst>
-              <a:ext uri="{FF2B5EF4-FFF2-40B4-BE49-F238E27FC236}">
-                <a16:creationId xmlns:a16="http://schemas.microsoft.com/office/drawing/2014/main" id="{332C18DA-9106-000E-66C0-039168B74F3F}"/>
-              </a:ext>
-            </a:extLst>
-          </p:cNvPr>
-          <p:cNvSpPr txBox="1"/>
-          <p:nvPr/>
-        </p:nvSpPr>
-        <p:spPr>
-          <a:xfrm>
-            <a:off x="2655906" y="1703817"/>
-            <a:ext cx="301686" cy="369332"/>
-          </a:xfrm>
-          <a:prstGeom prst="rect">
-            <a:avLst/>
-          </a:prstGeom>
-          <a:noFill/>
-        </p:spPr>
-        <p:txBody>
-          <a:bodyPr wrap="none" rtlCol="0">
-            <a:spAutoFit/>
-          </a:bodyPr>
-          <a:lstStyle>
-            <a:defPPr>
-              <a:defRPr lang="en-US"/>
-            </a:defPPr>
-            <a:lvl1pPr>
-              <a:defRPr b="1">
-                <a:solidFill>
-                  <a:srgbClr val="FF3272"/>
-                </a:solidFill>
-              </a:defRPr>
-            </a:lvl1pPr>
-          </a:lstStyle>
-          <a:p>
-            <a:r>
-              <a:rPr lang="en-US" dirty="0">
-                <a:solidFill>
-                  <a:srgbClr val="FF0000"/>
-                </a:solidFill>
-              </a:rPr>
-              <a:t>0</a:t>
-            </a:r>
-          </a:p>
-        </p:txBody>
-      </p:sp>
-      <p:sp>
-        <p:nvSpPr>
-          <p:cNvPr id="20" name="TextBox 19">
-            <a:extLst>
-              <a:ext uri="{FF2B5EF4-FFF2-40B4-BE49-F238E27FC236}">
-                <a16:creationId xmlns:a16="http://schemas.microsoft.com/office/drawing/2014/main" id="{B62EA235-AF99-D67A-4B6E-482C0B264CFA}"/>
-              </a:ext>
-            </a:extLst>
-          </p:cNvPr>
-          <p:cNvSpPr txBox="1"/>
-          <p:nvPr/>
-        </p:nvSpPr>
-        <p:spPr>
-          <a:xfrm>
-            <a:off x="3695250" y="1093536"/>
-            <a:ext cx="739754" cy="369332"/>
-          </a:xfrm>
-          <a:prstGeom prst="rect">
-            <a:avLst/>
-          </a:prstGeom>
-          <a:noFill/>
-        </p:spPr>
-        <p:txBody>
-          <a:bodyPr wrap="none" rtlCol="0">
-            <a:spAutoFit/>
-          </a:bodyPr>
-          <a:lstStyle/>
-          <a:p>
-            <a:r>
-              <a:rPr lang="en-US" b="1" dirty="0">
-                <a:solidFill>
-                  <a:srgbClr val="FF3272"/>
-                </a:solidFill>
-              </a:rPr>
-              <a:t>(</a:t>
-            </a:r>
-            <a:r>
-              <a:rPr lang="en-US" b="1" dirty="0" err="1">
-                <a:solidFill>
-                  <a:srgbClr val="FF0000"/>
-                </a:solidFill>
-              </a:rPr>
-              <a:t>x,y,z</a:t>
-            </a:r>
-            <a:r>
-              <a:rPr lang="en-US" b="1" dirty="0">
-                <a:solidFill>
-                  <a:srgbClr val="FF0000"/>
-                </a:solidFill>
-              </a:rPr>
-              <a:t>)</a:t>
-            </a:r>
-          </a:p>
-        </p:txBody>
-      </p:sp>
-      <p:sp>
-        <p:nvSpPr>
-          <p:cNvPr id="21" name="TextBox 20">
-            <a:extLst>
-              <a:ext uri="{FF2B5EF4-FFF2-40B4-BE49-F238E27FC236}">
-                <a16:creationId xmlns:a16="http://schemas.microsoft.com/office/drawing/2014/main" id="{FB822551-2C57-BC72-1484-3009A7AB261F}"/>
-              </a:ext>
-            </a:extLst>
-          </p:cNvPr>
-          <p:cNvSpPr txBox="1"/>
-          <p:nvPr/>
-        </p:nvSpPr>
-        <p:spPr>
-          <a:xfrm>
-            <a:off x="2606992" y="2991121"/>
-            <a:ext cx="306494" cy="369332"/>
-          </a:xfrm>
-          <a:prstGeom prst="rect">
-            <a:avLst/>
-          </a:prstGeom>
-          <a:noFill/>
-        </p:spPr>
-        <p:txBody>
-          <a:bodyPr wrap="none" rtlCol="0">
-            <a:spAutoFit/>
-          </a:bodyPr>
-          <a:lstStyle/>
-          <a:p>
-            <a:r>
-              <a:rPr lang="en-US" b="1" dirty="0">
-                <a:solidFill>
-                  <a:srgbClr val="FF0000"/>
-                </a:solidFill>
-              </a:rPr>
-              <a:t>u</a:t>
-            </a:r>
-          </a:p>
-        </p:txBody>
-      </p:sp>
-      <p:cxnSp>
-        <p:nvCxnSpPr>
-          <p:cNvPr id="24" name="Straight Connector 23">
-            <a:extLst>
-              <a:ext uri="{FF2B5EF4-FFF2-40B4-BE49-F238E27FC236}">
-                <a16:creationId xmlns:a16="http://schemas.microsoft.com/office/drawing/2014/main" id="{E029E343-4E31-550C-B9F4-05AAF27B4A55}"/>
-              </a:ext>
-            </a:extLst>
-          </p:cNvPr>
-          <p:cNvCxnSpPr/>
-          <p:nvPr/>
-        </p:nvCxnSpPr>
-        <p:spPr>
-          <a:xfrm>
-            <a:off x="5957799" y="4117640"/>
-            <a:ext cx="5276258" cy="0"/>
-          </a:xfrm>
-          <a:prstGeom prst="line">
-            <a:avLst/>
-          </a:prstGeom>
-          <a:ln w="38100">
-            <a:solidFill>
+        </p:grpSpPr>
+        <p:cxnSp>
+          <p:nvCxnSpPr>
+            <p:cNvPr id="24" name="Straight Connector 23">
+              <a:extLst>
+                <a:ext uri="{FF2B5EF4-FFF2-40B4-BE49-F238E27FC236}">
+                  <a16:creationId xmlns:a16="http://schemas.microsoft.com/office/drawing/2014/main" id="{E029E343-4E31-550C-B9F4-05AAF27B4A55}"/>
+                </a:ext>
+              </a:extLst>
+            </p:cNvPr>
+            <p:cNvCxnSpPr/>
+            <p:nvPr/>
+          </p:nvCxnSpPr>
+          <p:spPr>
+            <a:xfrm>
+              <a:off x="5957799" y="4117640"/>
+              <a:ext cx="5276258" cy="0"/>
+            </a:xfrm>
+            <a:prstGeom prst="line">
+              <a:avLst/>
+            </a:prstGeom>
+            <a:ln w="38100">
+              <a:solidFill>
+                <a:schemeClr val="tx1"/>
+              </a:solidFill>
+            </a:ln>
+          </p:spPr>
+          <p:style>
+            <a:lnRef idx="1">
+              <a:schemeClr val="accent1"/>
+            </a:lnRef>
+            <a:fillRef idx="0">
+              <a:schemeClr val="accent1"/>
+            </a:fillRef>
+            <a:effectRef idx="0">
+              <a:schemeClr val="accent1"/>
+            </a:effectRef>
+            <a:fontRef idx="minor">
               <a:schemeClr val="tx1"/>
-            </a:solidFill>
-          </a:ln>
-        </p:spPr>
-        <p:style>
-          <a:lnRef idx="1">
-            <a:schemeClr val="accent1"/>
-          </a:lnRef>
-          <a:fillRef idx="0">
-            <a:schemeClr val="accent1"/>
-          </a:fillRef>
-          <a:effectRef idx="0">
-            <a:schemeClr val="accent1"/>
-          </a:effectRef>
-          <a:fontRef idx="minor">
-            <a:schemeClr val="tx1"/>
-          </a:fontRef>
-        </p:style>
-      </p:cxnSp>
-      <p:cxnSp>
-        <p:nvCxnSpPr>
-          <p:cNvPr id="25" name="Straight Connector 24">
-            <a:extLst>
-              <a:ext uri="{FF2B5EF4-FFF2-40B4-BE49-F238E27FC236}">
-                <a16:creationId xmlns:a16="http://schemas.microsoft.com/office/drawing/2014/main" id="{20D66331-FF04-188A-EB2E-9253EDFA3AD7}"/>
-              </a:ext>
-            </a:extLst>
-          </p:cNvPr>
-          <p:cNvCxnSpPr>
-            <a:cxnSpLocks/>
-          </p:cNvCxnSpPr>
-          <p:nvPr/>
-        </p:nvCxnSpPr>
-        <p:spPr>
-          <a:xfrm flipV="1">
-            <a:off x="8950897" y="3374528"/>
-            <a:ext cx="1442594" cy="743112"/>
-          </a:xfrm>
-          <a:prstGeom prst="line">
-            <a:avLst/>
-          </a:prstGeom>
-          <a:ln w="28575">
-            <a:solidFill>
-              <a:srgbClr val="F04B52"/>
-            </a:solidFill>
-            <a:prstDash val="dash"/>
-            <a:headEnd type="oval"/>
-            <a:tailEnd type="oval" w="med" len="med"/>
-          </a:ln>
-        </p:spPr>
-        <p:style>
-          <a:lnRef idx="1">
-            <a:schemeClr val="accent1"/>
-          </a:lnRef>
-          <a:fillRef idx="0">
-            <a:schemeClr val="accent1"/>
-          </a:fillRef>
-          <a:effectRef idx="0">
-            <a:schemeClr val="accent1"/>
-          </a:effectRef>
-          <a:fontRef idx="minor">
-            <a:schemeClr val="tx1"/>
-          </a:fontRef>
-        </p:style>
-      </p:cxnSp>
-      <p:cxnSp>
-        <p:nvCxnSpPr>
-          <p:cNvPr id="30" name="Straight Connector 29">
-            <a:extLst>
-              <a:ext uri="{FF2B5EF4-FFF2-40B4-BE49-F238E27FC236}">
-                <a16:creationId xmlns:a16="http://schemas.microsoft.com/office/drawing/2014/main" id="{6E89C9FA-CD0E-D646-F331-60333E580882}"/>
-              </a:ext>
-            </a:extLst>
-          </p:cNvPr>
-          <p:cNvCxnSpPr>
-            <a:cxnSpLocks/>
-          </p:cNvCxnSpPr>
-          <p:nvPr/>
-        </p:nvCxnSpPr>
-        <p:spPr>
-          <a:xfrm>
-            <a:off x="8773473" y="3867782"/>
-            <a:ext cx="177424" cy="249857"/>
-          </a:xfrm>
-          <a:prstGeom prst="line">
-            <a:avLst/>
-          </a:prstGeom>
-          <a:ln w="28575">
-            <a:solidFill>
-              <a:srgbClr val="F04B52"/>
-            </a:solidFill>
-            <a:prstDash val="dash"/>
-            <a:headEnd type="oval"/>
-            <a:tailEnd type="oval" w="lg" len="lg"/>
-          </a:ln>
-        </p:spPr>
-        <p:style>
-          <a:lnRef idx="1">
-            <a:schemeClr val="accent1"/>
-          </a:lnRef>
-          <a:fillRef idx="0">
-            <a:schemeClr val="accent1"/>
-          </a:fillRef>
-          <a:effectRef idx="0">
-            <a:schemeClr val="accent1"/>
-          </a:effectRef>
-          <a:fontRef idx="minor">
-            <a:schemeClr val="tx1"/>
-          </a:fontRef>
-        </p:style>
-      </p:cxnSp>
-      <p:cxnSp>
-        <p:nvCxnSpPr>
-          <p:cNvPr id="33" name="Straight Connector 32">
-            <a:extLst>
-              <a:ext uri="{FF2B5EF4-FFF2-40B4-BE49-F238E27FC236}">
-                <a16:creationId xmlns:a16="http://schemas.microsoft.com/office/drawing/2014/main" id="{FC7533ED-BCDF-21D8-7210-491EB83BE363}"/>
-              </a:ext>
-            </a:extLst>
-          </p:cNvPr>
-          <p:cNvCxnSpPr>
-            <a:cxnSpLocks/>
-          </p:cNvCxnSpPr>
-          <p:nvPr/>
-        </p:nvCxnSpPr>
-        <p:spPr>
-          <a:xfrm flipH="1">
-            <a:off x="8950897" y="4038600"/>
-            <a:ext cx="383603" cy="79039"/>
-          </a:xfrm>
-          <a:prstGeom prst="line">
-            <a:avLst/>
-          </a:prstGeom>
-          <a:ln w="28575">
-            <a:solidFill>
-              <a:srgbClr val="F04B52"/>
-            </a:solidFill>
-            <a:prstDash val="dash"/>
-            <a:headEnd type="oval"/>
-            <a:tailEnd type="oval" w="lg" len="lg"/>
-          </a:ln>
-        </p:spPr>
-        <p:style>
-          <a:lnRef idx="1">
-            <a:schemeClr val="accent1"/>
-          </a:lnRef>
-          <a:fillRef idx="0">
-            <a:schemeClr val="accent1"/>
-          </a:fillRef>
-          <a:effectRef idx="0">
-            <a:schemeClr val="accent1"/>
-          </a:effectRef>
-          <a:fontRef idx="minor">
-            <a:schemeClr val="tx1"/>
-          </a:fontRef>
-        </p:style>
-      </p:cxnSp>
-      <p:sp>
-        <p:nvSpPr>
-          <p:cNvPr id="42" name="TextBox 41">
-            <a:extLst>
-              <a:ext uri="{FF2B5EF4-FFF2-40B4-BE49-F238E27FC236}">
-                <a16:creationId xmlns:a16="http://schemas.microsoft.com/office/drawing/2014/main" id="{A02A2C26-F89D-774B-0758-CB74033F1C0C}"/>
-              </a:ext>
-            </a:extLst>
-          </p:cNvPr>
-          <p:cNvSpPr txBox="1"/>
-          <p:nvPr/>
-        </p:nvSpPr>
-        <p:spPr>
-          <a:xfrm>
-            <a:off x="7924800" y="3556670"/>
-            <a:ext cx="751937" cy="369332"/>
-          </a:xfrm>
-          <a:prstGeom prst="rect">
-            <a:avLst/>
-          </a:prstGeom>
-          <a:noFill/>
-        </p:spPr>
-        <p:txBody>
-          <a:bodyPr wrap="none" rtlCol="0">
-            <a:spAutoFit/>
-          </a:bodyPr>
-          <a:lstStyle/>
-          <a:p>
-            <a:r>
-              <a:rPr lang="en-US" b="1" dirty="0">
-                <a:solidFill>
-                  <a:srgbClr val="FF0000"/>
-                </a:solidFill>
-              </a:rPr>
-              <a:t>vague</a:t>
-            </a:r>
-          </a:p>
-        </p:txBody>
-      </p:sp>
-      <p:sp>
-        <p:nvSpPr>
-          <p:cNvPr id="43" name="TextBox 42">
-            <a:extLst>
-              <a:ext uri="{FF2B5EF4-FFF2-40B4-BE49-F238E27FC236}">
-                <a16:creationId xmlns:a16="http://schemas.microsoft.com/office/drawing/2014/main" id="{F811215B-195B-D612-9E49-76DA52D92CD8}"/>
-              </a:ext>
-            </a:extLst>
-          </p:cNvPr>
-          <p:cNvSpPr txBox="1"/>
-          <p:nvPr/>
-        </p:nvSpPr>
-        <p:spPr>
-          <a:xfrm>
-            <a:off x="9227755" y="4108747"/>
-            <a:ext cx="751937" cy="369332"/>
-          </a:xfrm>
-          <a:prstGeom prst="rect">
-            <a:avLst/>
-          </a:prstGeom>
-          <a:noFill/>
-        </p:spPr>
-        <p:txBody>
-          <a:bodyPr wrap="none" rtlCol="0">
-            <a:spAutoFit/>
-          </a:bodyPr>
-          <a:lstStyle/>
-          <a:p>
-            <a:r>
-              <a:rPr lang="en-US" b="1" dirty="0">
-                <a:solidFill>
-                  <a:srgbClr val="FF0000"/>
-                </a:solidFill>
-              </a:rPr>
-              <a:t>vague</a:t>
-            </a:r>
-          </a:p>
-        </p:txBody>
-      </p:sp>
-      <p:sp>
-        <p:nvSpPr>
-          <p:cNvPr id="44" name="TextBox 43">
-            <a:extLst>
-              <a:ext uri="{FF2B5EF4-FFF2-40B4-BE49-F238E27FC236}">
-                <a16:creationId xmlns:a16="http://schemas.microsoft.com/office/drawing/2014/main" id="{BEBCBCC7-D27D-A121-8CE7-05CC8D9F7C1B}"/>
-              </a:ext>
-            </a:extLst>
-          </p:cNvPr>
-          <p:cNvSpPr txBox="1"/>
-          <p:nvPr/>
-        </p:nvSpPr>
-        <p:spPr>
-          <a:xfrm>
-            <a:off x="7561474" y="4299501"/>
-            <a:ext cx="1021242" cy="369332"/>
-          </a:xfrm>
-          <a:prstGeom prst="rect">
-            <a:avLst/>
-          </a:prstGeom>
-          <a:noFill/>
-        </p:spPr>
-        <p:txBody>
-          <a:bodyPr wrap="none" rtlCol="0">
-            <a:spAutoFit/>
-          </a:bodyPr>
-          <a:lstStyle/>
-          <a:p>
-            <a:r>
-              <a:rPr lang="en-US" b="1" dirty="0">
-                <a:solidFill>
-                  <a:srgbClr val="FF0000"/>
-                </a:solidFill>
-              </a:rPr>
-              <a:t>the weld</a:t>
-            </a:r>
-          </a:p>
-        </p:txBody>
-      </p:sp>
-      <p:sp>
-        <p:nvSpPr>
-          <p:cNvPr id="45" name="TextBox 44">
-            <a:extLst>
-              <a:ext uri="{FF2B5EF4-FFF2-40B4-BE49-F238E27FC236}">
-                <a16:creationId xmlns:a16="http://schemas.microsoft.com/office/drawing/2014/main" id="{964C4EE8-E8E7-A742-300B-BFEBF0BBC0F6}"/>
-              </a:ext>
-            </a:extLst>
-          </p:cNvPr>
-          <p:cNvSpPr txBox="1"/>
-          <p:nvPr/>
-        </p:nvSpPr>
-        <p:spPr>
-          <a:xfrm>
-            <a:off x="10570915" y="3197402"/>
-            <a:ext cx="661720" cy="369332"/>
-          </a:xfrm>
-          <a:prstGeom prst="rect">
-            <a:avLst/>
-          </a:prstGeom>
-          <a:noFill/>
-        </p:spPr>
-        <p:txBody>
-          <a:bodyPr wrap="none" rtlCol="0">
-            <a:spAutoFit/>
-          </a:bodyPr>
-          <a:lstStyle/>
-          <a:p>
-            <a:r>
-              <a:rPr lang="en-US" b="1" dirty="0">
-                <a:solidFill>
-                  <a:srgbClr val="1DB66E"/>
-                </a:solidFill>
-              </a:rPr>
-              <a:t>good</a:t>
-            </a:r>
-          </a:p>
-        </p:txBody>
-      </p:sp>
-      <p:cxnSp>
-        <p:nvCxnSpPr>
-          <p:cNvPr id="46" name="Straight Connector 45">
-            <a:extLst>
-              <a:ext uri="{FF2B5EF4-FFF2-40B4-BE49-F238E27FC236}">
-                <a16:creationId xmlns:a16="http://schemas.microsoft.com/office/drawing/2014/main" id="{22FEA049-40C8-AC92-67B3-0DD3729BC721}"/>
-              </a:ext>
-            </a:extLst>
-          </p:cNvPr>
-          <p:cNvCxnSpPr>
-            <a:cxnSpLocks/>
-          </p:cNvCxnSpPr>
-          <p:nvPr/>
-        </p:nvCxnSpPr>
-        <p:spPr>
-          <a:xfrm flipV="1">
-            <a:off x="9068373" y="1828800"/>
-            <a:ext cx="1426925" cy="1821925"/>
-          </a:xfrm>
-          <a:prstGeom prst="line">
-            <a:avLst/>
-          </a:prstGeom>
-          <a:ln w="38100">
-            <a:solidFill>
+            </a:fontRef>
+          </p:style>
+        </p:cxnSp>
+        <p:cxnSp>
+          <p:nvCxnSpPr>
+            <p:cNvPr id="25" name="Straight Connector 24">
+              <a:extLst>
+                <a:ext uri="{FF2B5EF4-FFF2-40B4-BE49-F238E27FC236}">
+                  <a16:creationId xmlns:a16="http://schemas.microsoft.com/office/drawing/2014/main" id="{20D66331-FF04-188A-EB2E-9253EDFA3AD7}"/>
+                </a:ext>
+              </a:extLst>
+            </p:cNvPr>
+            <p:cNvCxnSpPr>
+              <a:cxnSpLocks/>
+            </p:cNvCxnSpPr>
+            <p:nvPr/>
+          </p:nvCxnSpPr>
+          <p:spPr>
+            <a:xfrm flipV="1">
+              <a:off x="8950897" y="3374528"/>
+              <a:ext cx="1442594" cy="743112"/>
+            </a:xfrm>
+            <a:prstGeom prst="line">
+              <a:avLst/>
+            </a:prstGeom>
+            <a:ln w="28575">
+              <a:solidFill>
+                <a:srgbClr val="F04B52"/>
+              </a:solidFill>
+              <a:prstDash val="dash"/>
+              <a:headEnd type="oval"/>
+              <a:tailEnd type="oval" w="med" len="med"/>
+            </a:ln>
+          </p:spPr>
+          <p:style>
+            <a:lnRef idx="1">
+              <a:schemeClr val="accent1"/>
+            </a:lnRef>
+            <a:fillRef idx="0">
+              <a:schemeClr val="accent1"/>
+            </a:fillRef>
+            <a:effectRef idx="0">
+              <a:schemeClr val="accent1"/>
+            </a:effectRef>
+            <a:fontRef idx="minor">
               <a:schemeClr val="tx1"/>
-            </a:solidFill>
-          </a:ln>
-        </p:spPr>
-        <p:style>
-          <a:lnRef idx="1">
-            <a:schemeClr val="accent1"/>
-          </a:lnRef>
-          <a:fillRef idx="0">
-            <a:schemeClr val="accent1"/>
-          </a:fillRef>
-          <a:effectRef idx="0">
-            <a:schemeClr val="accent1"/>
-          </a:effectRef>
-          <a:fontRef idx="minor">
-            <a:schemeClr val="tx1"/>
-          </a:fontRef>
-        </p:style>
-      </p:cxnSp>
+            </a:fontRef>
+          </p:style>
+        </p:cxnSp>
+        <p:cxnSp>
+          <p:nvCxnSpPr>
+            <p:cNvPr id="30" name="Straight Connector 29">
+              <a:extLst>
+                <a:ext uri="{FF2B5EF4-FFF2-40B4-BE49-F238E27FC236}">
+                  <a16:creationId xmlns:a16="http://schemas.microsoft.com/office/drawing/2014/main" id="{6E89C9FA-CD0E-D646-F331-60333E580882}"/>
+                </a:ext>
+              </a:extLst>
+            </p:cNvPr>
+            <p:cNvCxnSpPr>
+              <a:cxnSpLocks/>
+            </p:cNvCxnSpPr>
+            <p:nvPr/>
+          </p:nvCxnSpPr>
+          <p:spPr>
+            <a:xfrm>
+              <a:off x="8773473" y="3867782"/>
+              <a:ext cx="177424" cy="249857"/>
+            </a:xfrm>
+            <a:prstGeom prst="line">
+              <a:avLst/>
+            </a:prstGeom>
+            <a:ln w="28575">
+              <a:solidFill>
+                <a:srgbClr val="F04B52"/>
+              </a:solidFill>
+              <a:prstDash val="dash"/>
+              <a:headEnd type="oval"/>
+              <a:tailEnd type="oval" w="lg" len="lg"/>
+            </a:ln>
+          </p:spPr>
+          <p:style>
+            <a:lnRef idx="1">
+              <a:schemeClr val="accent1"/>
+            </a:lnRef>
+            <a:fillRef idx="0">
+              <a:schemeClr val="accent1"/>
+            </a:fillRef>
+            <a:effectRef idx="0">
+              <a:schemeClr val="accent1"/>
+            </a:effectRef>
+            <a:fontRef idx="minor">
+              <a:schemeClr val="tx1"/>
+            </a:fontRef>
+          </p:style>
+        </p:cxnSp>
+        <p:cxnSp>
+          <p:nvCxnSpPr>
+            <p:cNvPr id="33" name="Straight Connector 32">
+              <a:extLst>
+                <a:ext uri="{FF2B5EF4-FFF2-40B4-BE49-F238E27FC236}">
+                  <a16:creationId xmlns:a16="http://schemas.microsoft.com/office/drawing/2014/main" id="{FC7533ED-BCDF-21D8-7210-491EB83BE363}"/>
+                </a:ext>
+              </a:extLst>
+            </p:cNvPr>
+            <p:cNvCxnSpPr>
+              <a:cxnSpLocks/>
+            </p:cNvCxnSpPr>
+            <p:nvPr/>
+          </p:nvCxnSpPr>
+          <p:spPr>
+            <a:xfrm flipH="1">
+              <a:off x="8950897" y="4038600"/>
+              <a:ext cx="383603" cy="79039"/>
+            </a:xfrm>
+            <a:prstGeom prst="line">
+              <a:avLst/>
+            </a:prstGeom>
+            <a:ln w="28575">
+              <a:solidFill>
+                <a:srgbClr val="F04B52"/>
+              </a:solidFill>
+              <a:prstDash val="dash"/>
+              <a:headEnd type="oval"/>
+              <a:tailEnd type="oval" w="lg" len="lg"/>
+            </a:ln>
+          </p:spPr>
+          <p:style>
+            <a:lnRef idx="1">
+              <a:schemeClr val="accent1"/>
+            </a:lnRef>
+            <a:fillRef idx="0">
+              <a:schemeClr val="accent1"/>
+            </a:fillRef>
+            <a:effectRef idx="0">
+              <a:schemeClr val="accent1"/>
+            </a:effectRef>
+            <a:fontRef idx="minor">
+              <a:schemeClr val="tx1"/>
+            </a:fontRef>
+          </p:style>
+        </p:cxnSp>
+        <p:sp>
+          <p:nvSpPr>
+            <p:cNvPr id="42" name="TextBox 41">
+              <a:extLst>
+                <a:ext uri="{FF2B5EF4-FFF2-40B4-BE49-F238E27FC236}">
+                  <a16:creationId xmlns:a16="http://schemas.microsoft.com/office/drawing/2014/main" id="{A02A2C26-F89D-774B-0758-CB74033F1C0C}"/>
+                </a:ext>
+              </a:extLst>
+            </p:cNvPr>
+            <p:cNvSpPr txBox="1"/>
+            <p:nvPr/>
+          </p:nvSpPr>
+          <p:spPr>
+            <a:xfrm>
+              <a:off x="7924800" y="3556670"/>
+              <a:ext cx="751937" cy="369332"/>
+            </a:xfrm>
+            <a:prstGeom prst="rect">
+              <a:avLst/>
+            </a:prstGeom>
+            <a:noFill/>
+          </p:spPr>
+          <p:txBody>
+            <a:bodyPr wrap="none" rtlCol="0">
+              <a:spAutoFit/>
+            </a:bodyPr>
+            <a:lstStyle/>
+            <a:p>
+              <a:r>
+                <a:rPr lang="en-US" b="1" dirty="0">
+                  <a:solidFill>
+                    <a:srgbClr val="FF0000"/>
+                  </a:solidFill>
+                </a:rPr>
+                <a:t>vague</a:t>
+              </a:r>
+            </a:p>
+          </p:txBody>
+        </p:sp>
+        <p:sp>
+          <p:nvSpPr>
+            <p:cNvPr id="43" name="TextBox 42">
+              <a:extLst>
+                <a:ext uri="{FF2B5EF4-FFF2-40B4-BE49-F238E27FC236}">
+                  <a16:creationId xmlns:a16="http://schemas.microsoft.com/office/drawing/2014/main" id="{F811215B-195B-D612-9E49-76DA52D92CD8}"/>
+                </a:ext>
+              </a:extLst>
+            </p:cNvPr>
+            <p:cNvSpPr txBox="1"/>
+            <p:nvPr/>
+          </p:nvSpPr>
+          <p:spPr>
+            <a:xfrm>
+              <a:off x="9227755" y="4108747"/>
+              <a:ext cx="751937" cy="369332"/>
+            </a:xfrm>
+            <a:prstGeom prst="rect">
+              <a:avLst/>
+            </a:prstGeom>
+            <a:noFill/>
+          </p:spPr>
+          <p:txBody>
+            <a:bodyPr wrap="none" rtlCol="0">
+              <a:spAutoFit/>
+            </a:bodyPr>
+            <a:lstStyle/>
+            <a:p>
+              <a:r>
+                <a:rPr lang="en-US" b="1" dirty="0">
+                  <a:solidFill>
+                    <a:srgbClr val="FF0000"/>
+                  </a:solidFill>
+                </a:rPr>
+                <a:t>vague</a:t>
+              </a:r>
+            </a:p>
+          </p:txBody>
+        </p:sp>
+        <p:sp>
+          <p:nvSpPr>
+            <p:cNvPr id="44" name="TextBox 43">
+              <a:extLst>
+                <a:ext uri="{FF2B5EF4-FFF2-40B4-BE49-F238E27FC236}">
+                  <a16:creationId xmlns:a16="http://schemas.microsoft.com/office/drawing/2014/main" id="{BEBCBCC7-D27D-A121-8CE7-05CC8D9F7C1B}"/>
+                </a:ext>
+              </a:extLst>
+            </p:cNvPr>
+            <p:cNvSpPr txBox="1"/>
+            <p:nvPr/>
+          </p:nvSpPr>
+          <p:spPr>
+            <a:xfrm>
+              <a:off x="7561474" y="4299501"/>
+              <a:ext cx="1021242" cy="369332"/>
+            </a:xfrm>
+            <a:prstGeom prst="rect">
+              <a:avLst/>
+            </a:prstGeom>
+            <a:noFill/>
+          </p:spPr>
+          <p:txBody>
+            <a:bodyPr wrap="none" rtlCol="0">
+              <a:spAutoFit/>
+            </a:bodyPr>
+            <a:lstStyle/>
+            <a:p>
+              <a:r>
+                <a:rPr lang="en-US" b="1" dirty="0">
+                  <a:solidFill>
+                    <a:srgbClr val="FF0000"/>
+                  </a:solidFill>
+                </a:rPr>
+                <a:t>the weld</a:t>
+              </a:r>
+            </a:p>
+          </p:txBody>
+        </p:sp>
+        <p:sp>
+          <p:nvSpPr>
+            <p:cNvPr id="45" name="TextBox 44">
+              <a:extLst>
+                <a:ext uri="{FF2B5EF4-FFF2-40B4-BE49-F238E27FC236}">
+                  <a16:creationId xmlns:a16="http://schemas.microsoft.com/office/drawing/2014/main" id="{964C4EE8-E8E7-A742-300B-BFEBF0BBC0F6}"/>
+                </a:ext>
+              </a:extLst>
+            </p:cNvPr>
+            <p:cNvSpPr txBox="1"/>
+            <p:nvPr/>
+          </p:nvSpPr>
+          <p:spPr>
+            <a:xfrm>
+              <a:off x="10570915" y="3197402"/>
+              <a:ext cx="661720" cy="369332"/>
+            </a:xfrm>
+            <a:prstGeom prst="rect">
+              <a:avLst/>
+            </a:prstGeom>
+            <a:noFill/>
+          </p:spPr>
+          <p:txBody>
+            <a:bodyPr wrap="none" rtlCol="0">
+              <a:spAutoFit/>
+            </a:bodyPr>
+            <a:lstStyle/>
+            <a:p>
+              <a:r>
+                <a:rPr lang="en-US" b="1" dirty="0">
+                  <a:solidFill>
+                    <a:srgbClr val="1DB66E"/>
+                  </a:solidFill>
+                </a:rPr>
+                <a:t>good</a:t>
+              </a:r>
+            </a:p>
+          </p:txBody>
+        </p:sp>
+        <p:cxnSp>
+          <p:nvCxnSpPr>
+            <p:cNvPr id="46" name="Straight Connector 45">
+              <a:extLst>
+                <a:ext uri="{FF2B5EF4-FFF2-40B4-BE49-F238E27FC236}">
+                  <a16:creationId xmlns:a16="http://schemas.microsoft.com/office/drawing/2014/main" id="{22FEA049-40C8-AC92-67B3-0DD3729BC721}"/>
+                </a:ext>
+              </a:extLst>
+            </p:cNvPr>
+            <p:cNvCxnSpPr>
+              <a:cxnSpLocks/>
+            </p:cNvCxnSpPr>
+            <p:nvPr/>
+          </p:nvCxnSpPr>
+          <p:spPr>
+            <a:xfrm flipV="1">
+              <a:off x="9068373" y="1828800"/>
+              <a:ext cx="1426925" cy="1821925"/>
+            </a:xfrm>
+            <a:prstGeom prst="line">
+              <a:avLst/>
+            </a:prstGeom>
+            <a:ln w="38100">
+              <a:solidFill>
+                <a:schemeClr val="tx1"/>
+              </a:solidFill>
+            </a:ln>
+          </p:spPr>
+          <p:style>
+            <a:lnRef idx="1">
+              <a:schemeClr val="accent1"/>
+            </a:lnRef>
+            <a:fillRef idx="0">
+              <a:schemeClr val="accent1"/>
+            </a:fillRef>
+            <a:effectRef idx="0">
+              <a:schemeClr val="accent1"/>
+            </a:effectRef>
+            <a:fontRef idx="minor">
+              <a:schemeClr val="tx1"/>
+            </a:fontRef>
+          </p:style>
+        </p:cxnSp>
+      </p:grpSp>
     </p:spTree>
     <p:extLst>
       <p:ext uri="{BB962C8B-B14F-4D97-AF65-F5344CB8AC3E}">

</xml_diff>